<commit_message>
Changes to Poster, geostationary animatation and added radar animation
</commit_message>
<xml_diff>
--- a/Poster.pptx
+++ b/Poster.pptx
@@ -104,6 +104,11 @@
       </a:defRPr>
     </a:lvl9pPr>
   </p:defaultTextStyle>
+  <p:extLst>
+    <p:ext uri="{EFAFB233-063F-42B5-8137-9DF3F51BA10A}">
+      <p15:sldGuideLst xmlns:p15="http://schemas.microsoft.com/office/powerpoint/2012/main"/>
+    </p:ext>
+  </p:extLst>
 </p:presentation>
 </file>
 
@@ -238,9 +243,9 @@
           <a:p>
             <a:fld id="{4A9D21B9-5EE3-432D-A6A9-C33BB618ACB5}" type="datetimeFigureOut">
               <a:rPr lang="en-GB" smtClean="0"/>
-              <a:t>26/06/2017</a:t>
+              <a:t>03/07/2017</a:t>
             </a:fld>
-            <a:endParaRPr lang="en-GB"/>
+            <a:endParaRPr lang="en-GB" dirty="0"/>
           </a:p>
         </p:txBody>
       </p:sp>
@@ -259,7 +264,7 @@
           <a:bodyPr/>
           <a:lstStyle/>
           <a:p>
-            <a:endParaRPr lang="en-GB"/>
+            <a:endParaRPr lang="en-GB" dirty="0"/>
           </a:p>
         </p:txBody>
       </p:sp>
@@ -282,7 +287,7 @@
               <a:rPr lang="en-GB" smtClean="0"/>
               <a:t>‹#›</a:t>
             </a:fld>
-            <a:endParaRPr lang="en-GB"/>
+            <a:endParaRPr lang="en-GB" dirty="0"/>
           </a:p>
         </p:txBody>
       </p:sp>
@@ -408,9 +413,9 @@
           <a:p>
             <a:fld id="{4A9D21B9-5EE3-432D-A6A9-C33BB618ACB5}" type="datetimeFigureOut">
               <a:rPr lang="en-GB" smtClean="0"/>
-              <a:t>26/06/2017</a:t>
+              <a:t>03/07/2017</a:t>
             </a:fld>
-            <a:endParaRPr lang="en-GB"/>
+            <a:endParaRPr lang="en-GB" dirty="0"/>
           </a:p>
         </p:txBody>
       </p:sp>
@@ -429,7 +434,7 @@
           <a:bodyPr/>
           <a:lstStyle/>
           <a:p>
-            <a:endParaRPr lang="en-GB"/>
+            <a:endParaRPr lang="en-GB" dirty="0"/>
           </a:p>
         </p:txBody>
       </p:sp>
@@ -452,7 +457,7 @@
               <a:rPr lang="en-GB" smtClean="0"/>
               <a:t>‹#›</a:t>
             </a:fld>
-            <a:endParaRPr lang="en-GB"/>
+            <a:endParaRPr lang="en-GB" dirty="0"/>
           </a:p>
         </p:txBody>
       </p:sp>
@@ -588,9 +593,9 @@
           <a:p>
             <a:fld id="{4A9D21B9-5EE3-432D-A6A9-C33BB618ACB5}" type="datetimeFigureOut">
               <a:rPr lang="en-GB" smtClean="0"/>
-              <a:t>26/06/2017</a:t>
+              <a:t>03/07/2017</a:t>
             </a:fld>
-            <a:endParaRPr lang="en-GB"/>
+            <a:endParaRPr lang="en-GB" dirty="0"/>
           </a:p>
         </p:txBody>
       </p:sp>
@@ -609,7 +614,7 @@
           <a:bodyPr/>
           <a:lstStyle/>
           <a:p>
-            <a:endParaRPr lang="en-GB"/>
+            <a:endParaRPr lang="en-GB" dirty="0"/>
           </a:p>
         </p:txBody>
       </p:sp>
@@ -632,7 +637,7 @@
               <a:rPr lang="en-GB" smtClean="0"/>
               <a:t>‹#›</a:t>
             </a:fld>
-            <a:endParaRPr lang="en-GB"/>
+            <a:endParaRPr lang="en-GB" dirty="0"/>
           </a:p>
         </p:txBody>
       </p:sp>
@@ -758,9 +763,9 @@
           <a:p>
             <a:fld id="{4A9D21B9-5EE3-432D-A6A9-C33BB618ACB5}" type="datetimeFigureOut">
               <a:rPr lang="en-GB" smtClean="0"/>
-              <a:t>26/06/2017</a:t>
+              <a:t>03/07/2017</a:t>
             </a:fld>
-            <a:endParaRPr lang="en-GB"/>
+            <a:endParaRPr lang="en-GB" dirty="0"/>
           </a:p>
         </p:txBody>
       </p:sp>
@@ -779,7 +784,7 @@
           <a:bodyPr/>
           <a:lstStyle/>
           <a:p>
-            <a:endParaRPr lang="en-GB"/>
+            <a:endParaRPr lang="en-GB" dirty="0"/>
           </a:p>
         </p:txBody>
       </p:sp>
@@ -802,7 +807,7 @@
               <a:rPr lang="en-GB" smtClean="0"/>
               <a:t>‹#›</a:t>
             </a:fld>
-            <a:endParaRPr lang="en-GB"/>
+            <a:endParaRPr lang="en-GB" dirty="0"/>
           </a:p>
         </p:txBody>
       </p:sp>
@@ -1004,9 +1009,9 @@
           <a:p>
             <a:fld id="{4A9D21B9-5EE3-432D-A6A9-C33BB618ACB5}" type="datetimeFigureOut">
               <a:rPr lang="en-GB" smtClean="0"/>
-              <a:t>26/06/2017</a:t>
+              <a:t>03/07/2017</a:t>
             </a:fld>
-            <a:endParaRPr lang="en-GB"/>
+            <a:endParaRPr lang="en-GB" dirty="0"/>
           </a:p>
         </p:txBody>
       </p:sp>
@@ -1025,7 +1030,7 @@
           <a:bodyPr/>
           <a:lstStyle/>
           <a:p>
-            <a:endParaRPr lang="en-GB"/>
+            <a:endParaRPr lang="en-GB" dirty="0"/>
           </a:p>
         </p:txBody>
       </p:sp>
@@ -1048,7 +1053,7 @@
               <a:rPr lang="en-GB" smtClean="0"/>
               <a:t>‹#›</a:t>
             </a:fld>
-            <a:endParaRPr lang="en-GB"/>
+            <a:endParaRPr lang="en-GB" dirty="0"/>
           </a:p>
         </p:txBody>
       </p:sp>
@@ -1236,9 +1241,9 @@
           <a:p>
             <a:fld id="{4A9D21B9-5EE3-432D-A6A9-C33BB618ACB5}" type="datetimeFigureOut">
               <a:rPr lang="en-GB" smtClean="0"/>
-              <a:t>26/06/2017</a:t>
+              <a:t>03/07/2017</a:t>
             </a:fld>
-            <a:endParaRPr lang="en-GB"/>
+            <a:endParaRPr lang="en-GB" dirty="0"/>
           </a:p>
         </p:txBody>
       </p:sp>
@@ -1257,7 +1262,7 @@
           <a:bodyPr/>
           <a:lstStyle/>
           <a:p>
-            <a:endParaRPr lang="en-GB"/>
+            <a:endParaRPr lang="en-GB" dirty="0"/>
           </a:p>
         </p:txBody>
       </p:sp>
@@ -1280,7 +1285,7 @@
               <a:rPr lang="en-GB" smtClean="0"/>
               <a:t>‹#›</a:t>
             </a:fld>
-            <a:endParaRPr lang="en-GB"/>
+            <a:endParaRPr lang="en-GB" dirty="0"/>
           </a:p>
         </p:txBody>
       </p:sp>
@@ -1603,9 +1608,9 @@
           <a:p>
             <a:fld id="{4A9D21B9-5EE3-432D-A6A9-C33BB618ACB5}" type="datetimeFigureOut">
               <a:rPr lang="en-GB" smtClean="0"/>
-              <a:t>26/06/2017</a:t>
+              <a:t>03/07/2017</a:t>
             </a:fld>
-            <a:endParaRPr lang="en-GB"/>
+            <a:endParaRPr lang="en-GB" dirty="0"/>
           </a:p>
         </p:txBody>
       </p:sp>
@@ -1624,7 +1629,7 @@
           <a:bodyPr/>
           <a:lstStyle/>
           <a:p>
-            <a:endParaRPr lang="en-GB"/>
+            <a:endParaRPr lang="en-GB" dirty="0"/>
           </a:p>
         </p:txBody>
       </p:sp>
@@ -1647,7 +1652,7 @@
               <a:rPr lang="en-GB" smtClean="0"/>
               <a:t>‹#›</a:t>
             </a:fld>
-            <a:endParaRPr lang="en-GB"/>
+            <a:endParaRPr lang="en-GB" dirty="0"/>
           </a:p>
         </p:txBody>
       </p:sp>
@@ -1721,9 +1726,9 @@
           <a:p>
             <a:fld id="{4A9D21B9-5EE3-432D-A6A9-C33BB618ACB5}" type="datetimeFigureOut">
               <a:rPr lang="en-GB" smtClean="0"/>
-              <a:t>26/06/2017</a:t>
+              <a:t>03/07/2017</a:t>
             </a:fld>
-            <a:endParaRPr lang="en-GB"/>
+            <a:endParaRPr lang="en-GB" dirty="0"/>
           </a:p>
         </p:txBody>
       </p:sp>
@@ -1742,7 +1747,7 @@
           <a:bodyPr/>
           <a:lstStyle/>
           <a:p>
-            <a:endParaRPr lang="en-GB"/>
+            <a:endParaRPr lang="en-GB" dirty="0"/>
           </a:p>
         </p:txBody>
       </p:sp>
@@ -1765,7 +1770,7 @@
               <a:rPr lang="en-GB" smtClean="0"/>
               <a:t>‹#›</a:t>
             </a:fld>
-            <a:endParaRPr lang="en-GB"/>
+            <a:endParaRPr lang="en-GB" dirty="0"/>
           </a:p>
         </p:txBody>
       </p:sp>
@@ -1816,9 +1821,9 @@
           <a:p>
             <a:fld id="{4A9D21B9-5EE3-432D-A6A9-C33BB618ACB5}" type="datetimeFigureOut">
               <a:rPr lang="en-GB" smtClean="0"/>
-              <a:t>26/06/2017</a:t>
+              <a:t>03/07/2017</a:t>
             </a:fld>
-            <a:endParaRPr lang="en-GB"/>
+            <a:endParaRPr lang="en-GB" dirty="0"/>
           </a:p>
         </p:txBody>
       </p:sp>
@@ -1837,7 +1842,7 @@
           <a:bodyPr/>
           <a:lstStyle/>
           <a:p>
-            <a:endParaRPr lang="en-GB"/>
+            <a:endParaRPr lang="en-GB" dirty="0"/>
           </a:p>
         </p:txBody>
       </p:sp>
@@ -1860,7 +1865,7 @@
               <a:rPr lang="en-GB" smtClean="0"/>
               <a:t>‹#›</a:t>
             </a:fld>
-            <a:endParaRPr lang="en-GB"/>
+            <a:endParaRPr lang="en-GB" dirty="0"/>
           </a:p>
         </p:txBody>
       </p:sp>
@@ -2093,9 +2098,9 @@
           <a:p>
             <a:fld id="{4A9D21B9-5EE3-432D-A6A9-C33BB618ACB5}" type="datetimeFigureOut">
               <a:rPr lang="en-GB" smtClean="0"/>
-              <a:t>26/06/2017</a:t>
+              <a:t>03/07/2017</a:t>
             </a:fld>
-            <a:endParaRPr lang="en-GB"/>
+            <a:endParaRPr lang="en-GB" dirty="0"/>
           </a:p>
         </p:txBody>
       </p:sp>
@@ -2114,7 +2119,7 @@
           <a:bodyPr/>
           <a:lstStyle/>
           <a:p>
-            <a:endParaRPr lang="en-GB"/>
+            <a:endParaRPr lang="en-GB" dirty="0"/>
           </a:p>
         </p:txBody>
       </p:sp>
@@ -2137,7 +2142,7 @@
               <a:rPr lang="en-GB" smtClean="0"/>
               <a:t>‹#›</a:t>
             </a:fld>
-            <a:endParaRPr lang="en-GB"/>
+            <a:endParaRPr lang="en-GB" dirty="0"/>
           </a:p>
         </p:txBody>
       </p:sp>
@@ -2260,7 +2265,7 @@
             </a:lvl9pPr>
           </a:lstStyle>
           <a:p>
-            <a:endParaRPr lang="en-GB"/>
+            <a:endParaRPr lang="en-GB" dirty="0"/>
           </a:p>
         </p:txBody>
       </p:sp>
@@ -2346,9 +2351,9 @@
           <a:p>
             <a:fld id="{4A9D21B9-5EE3-432D-A6A9-C33BB618ACB5}" type="datetimeFigureOut">
               <a:rPr lang="en-GB" smtClean="0"/>
-              <a:t>26/06/2017</a:t>
+              <a:t>03/07/2017</a:t>
             </a:fld>
-            <a:endParaRPr lang="en-GB"/>
+            <a:endParaRPr lang="en-GB" dirty="0"/>
           </a:p>
         </p:txBody>
       </p:sp>
@@ -2367,7 +2372,7 @@
           <a:bodyPr/>
           <a:lstStyle/>
           <a:p>
-            <a:endParaRPr lang="en-GB"/>
+            <a:endParaRPr lang="en-GB" dirty="0"/>
           </a:p>
         </p:txBody>
       </p:sp>
@@ -2390,7 +2395,7 @@
               <a:rPr lang="en-GB" smtClean="0"/>
               <a:t>‹#›</a:t>
             </a:fld>
-            <a:endParaRPr lang="en-GB"/>
+            <a:endParaRPr lang="en-GB" dirty="0"/>
           </a:p>
         </p:txBody>
       </p:sp>
@@ -2559,9 +2564,9 @@
           <a:p>
             <a:fld id="{4A9D21B9-5EE3-432D-A6A9-C33BB618ACB5}" type="datetimeFigureOut">
               <a:rPr lang="en-GB" smtClean="0"/>
-              <a:t>26/06/2017</a:t>
+              <a:t>03/07/2017</a:t>
             </a:fld>
-            <a:endParaRPr lang="en-GB"/>
+            <a:endParaRPr lang="en-GB" dirty="0"/>
           </a:p>
         </p:txBody>
       </p:sp>
@@ -2598,7 +2603,7 @@
             </a:lvl1pPr>
           </a:lstStyle>
           <a:p>
-            <a:endParaRPr lang="en-GB"/>
+            <a:endParaRPr lang="en-GB" dirty="0"/>
           </a:p>
         </p:txBody>
       </p:sp>
@@ -2639,7 +2644,7 @@
               <a:rPr lang="en-GB" smtClean="0"/>
               <a:t>‹#›</a:t>
             </a:fld>
-            <a:endParaRPr lang="en-GB"/>
+            <a:endParaRPr lang="en-GB" dirty="0"/>
           </a:p>
         </p:txBody>
       </p:sp>
@@ -2973,14 +2978,14 @@
           <p:nvPr>
             <p:extLst>
               <p:ext uri="{D42A27DB-BD31-4B8C-83A1-F6EECF244321}">
-                <p14:modId xmlns:p14="http://schemas.microsoft.com/office/powerpoint/2010/main" val="401330643"/>
+                <p14:modId xmlns:p14="http://schemas.microsoft.com/office/powerpoint/2010/main" val="2158044762"/>
               </p:ext>
             </p:extLst>
           </p:nvPr>
         </p:nvGraphicFramePr>
         <p:xfrm>
           <a:off x="342900" y="2114550"/>
-          <a:ext cx="29660850" cy="41261597"/>
+          <a:ext cx="29660850" cy="42084557"/>
         </p:xfrm>
         <a:graphic>
           <a:graphicData uri="http://schemas.openxmlformats.org/drawingml/2006/table">
@@ -3140,39 +3145,33 @@
                         <a:rPr lang="en-GB" sz="5400" b="1" baseline="0" dirty="0" smtClean="0">
                           <a:latin typeface="Arial Rounded MT Bold" panose="020F0704030504030204" pitchFamily="34" charset="0"/>
                         </a:rPr>
-                        <a:t> We Did The Synchrotron Challenge! We</a:t>
-                      </a:r>
-                    </a:p>
-                    <a:p>
-                      <a:r>
-                        <a:rPr lang="en-GB" sz="5400" b="1" baseline="0" dirty="0" smtClean="0">
-                          <a:latin typeface="Arial Rounded MT Bold" panose="020F0704030504030204" pitchFamily="34" charset="0"/>
-                        </a:rPr>
-                        <a:t>Programmed The Robot To Go Round The Circle Three Times And Then Speed up, x </a:t>
-                      </a:r>
-                      <a:r>
-                        <a:rPr lang="en-GB" sz="5400" b="1" baseline="0" smtClean="0">
-                          <a:latin typeface="Arial Rounded MT Bold" panose="020F0704030504030204" pitchFamily="34" charset="0"/>
-                        </a:rPr>
-                        <a:t>By 1.5 at </a:t>
+                        <a:t> We Did The </a:t>
                       </a:r>
                       <a:r>
                         <a:rPr lang="en-GB" sz="5400" b="1" baseline="0" dirty="0" smtClean="0">
                           <a:latin typeface="Arial Rounded MT Bold" panose="020F0704030504030204" pitchFamily="34" charset="0"/>
                         </a:rPr>
-                        <a:t>the red </a:t>
-                      </a:r>
-                      <a:r>
-                        <a:rPr lang="en-GB" sz="5400" b="1" baseline="0" smtClean="0">
-                          <a:latin typeface="Arial Rounded MT Bold" panose="020F0704030504030204" pitchFamily="34" charset="0"/>
-                        </a:rPr>
-                        <a:t>line .( </a:t>
+                        <a:t>Syncrotron </a:t>
                       </a:r>
                       <a:r>
                         <a:rPr lang="en-GB" sz="5400" b="1" baseline="0" dirty="0" smtClean="0">
                           <a:latin typeface="Arial Rounded MT Bold" panose="020F0704030504030204" pitchFamily="34" charset="0"/>
                         </a:rPr>
-                        <a:t>Where You Started Off )</a:t>
+                        <a:t>Challenge! We</a:t>
+                      </a:r>
+                    </a:p>
+                    <a:p>
+                      <a:r>
+                        <a:rPr lang="en-GB" sz="5400" b="1" baseline="0" dirty="0" smtClean="0">
+                          <a:latin typeface="Arial Rounded MT Bold" panose="020F0704030504030204" pitchFamily="34" charset="0"/>
+                        </a:rPr>
+                        <a:t>Programmed The Robot To Go Round The Circle Three </a:t>
+                      </a:r>
+                      <a:r>
+                        <a:rPr lang="en-GB" sz="5400" b="1" baseline="0" dirty="0" smtClean="0">
+                          <a:latin typeface="Arial Rounded MT Bold" panose="020F0704030504030204" pitchFamily="34" charset="0"/>
+                        </a:rPr>
+                        <a:t>Times, getting 1.5x faster every time it passed a red line(which is also the start.)</a:t>
                       </a:r>
                       <a:endParaRPr lang="en-GB" sz="5400" b="1" dirty="0" smtClean="0">
                         <a:latin typeface="Arial Rounded MT Bold" panose="020F0704030504030204" pitchFamily="34" charset="0"/>
@@ -3242,7 +3241,21 @@
                     <a:bodyPr/>
                     <a:lstStyle/>
                     <a:p>
-                      <a:endParaRPr lang="en-GB" dirty="0"/>
+                      <a:r>
+                        <a:rPr lang="en-GB" sz="5400" b="1" dirty="0" smtClean="0">
+                          <a:latin typeface="Arial Rounded MT Bold" panose="020F0704030504030204" pitchFamily="34" charset="0"/>
+                        </a:rPr>
+                        <a:t>Another</a:t>
+                      </a:r>
+                      <a:r>
+                        <a:rPr lang="en-GB" sz="5400" b="1" baseline="0" dirty="0" smtClean="0">
+                          <a:latin typeface="Arial Rounded MT Bold" panose="020F0704030504030204" pitchFamily="34" charset="0"/>
+                        </a:rPr>
+                        <a:t> challenge we undertook was the maze. We programmed our robot to drive forwards until it sensed an object. Then it would turn 90 degrees left before turning 180 degrees right whilst measuring how much space it would have if it went forwards  in that direction. The robot would then turn to whichever direction provided the most space and start the whole process all over again! </a:t>
+                      </a:r>
+                      <a:endParaRPr lang="en-GB" sz="5400" b="1" dirty="0">
+                        <a:latin typeface="Arial Rounded MT Bold" panose="020F0704030504030204" pitchFamily="34" charset="0"/>
+                      </a:endParaRPr>
                     </a:p>
                   </a:txBody>
                   <a:tcPr/>
@@ -3315,7 +3328,10 @@
                     <a:bodyPr/>
                     <a:lstStyle/>
                     <a:p>
-                      <a:endParaRPr lang="en-GB" dirty="0"/>
+                      <a:endParaRPr lang="en-GB" sz="5400" b="1" dirty="0">
+                        <a:latin typeface="Arial Rounded MT Bold" panose="020F0704030504030204" pitchFamily="34" charset="0"/>
+                        <a:cs typeface="Shonar Bangla" panose="020B0502040204020203" pitchFamily="34" charset="0"/>
+                      </a:endParaRPr>
                     </a:p>
                   </a:txBody>
                   <a:tcPr/>

</xml_diff>